<commit_message>
Add commit with History
</commit_message>
<xml_diff>
--- a/A comparative study of different features extracted from EIS in SoH for LIB/paper/A comparative study of different features extracted from EIS in SoH for LIB-V00.01-241106.pptx
+++ b/A comparative study of different features extracted from EIS in SoH for LIB/paper/A comparative study of different features extracted from EIS in SoH for LIB-V00.01-241106.pptx
@@ -276,7 +276,7 @@
           <a:p>
             <a:fld id="{D829F234-20F8-45D3-A094-E399EA9B6EDE}" type="datetimeFigureOut">
               <a:rPr lang="ko-KR" altLang="en-US" smtClean="0"/>
-              <a:t>2024-11-12</a:t>
+              <a:t>2024-11-13</a:t>
             </a:fld>
             <a:endParaRPr lang="ko-KR" altLang="en-US"/>
           </a:p>
@@ -541,6 +541,90 @@
     </a:lvl9pPr>
   </p:notesStyle>
 </p:notesMaster>
+</file>
+
+<file path=ppt/notesSlides/notesSlide1.xml><?xml version="1.0" encoding="utf-8"?>
+<p:notes xmlns:a="http://schemas.openxmlformats.org/drawingml/2006/main" xmlns:r="http://schemas.openxmlformats.org/officeDocument/2006/relationships" xmlns:p="http://schemas.openxmlformats.org/presentationml/2006/main">
+  <p:cSld>
+    <p:spTree>
+      <p:nvGrpSpPr>
+        <p:cNvPr id="1" name=""/>
+        <p:cNvGrpSpPr/>
+        <p:nvPr/>
+      </p:nvGrpSpPr>
+      <p:grpSpPr>
+        <a:xfrm>
+          <a:off x="0" y="0"/>
+          <a:ext cx="0" cy="0"/>
+          <a:chOff x="0" y="0"/>
+          <a:chExt cx="0" cy="0"/>
+        </a:xfrm>
+      </p:grpSpPr>
+      <p:sp>
+        <p:nvSpPr>
+          <p:cNvPr id="2" name="슬라이드 이미지 개체 틀 1"/>
+          <p:cNvSpPr>
+            <a:spLocks noGrp="1" noRot="1" noChangeAspect="1"/>
+          </p:cNvSpPr>
+          <p:nvPr>
+            <p:ph type="sldImg"/>
+          </p:nvPr>
+        </p:nvSpPr>
+        <p:spPr/>
+      </p:sp>
+      <p:sp>
+        <p:nvSpPr>
+          <p:cNvPr id="3" name="슬라이드 노트 개체 틀 2"/>
+          <p:cNvSpPr>
+            <a:spLocks noGrp="1"/>
+          </p:cNvSpPr>
+          <p:nvPr>
+            <p:ph type="body" idx="1"/>
+          </p:nvPr>
+        </p:nvSpPr>
+        <p:spPr/>
+        <p:txBody>
+          <a:bodyPr/>
+          <a:lstStyle/>
+          <a:p>
+            <a:endParaRPr lang="ko-KR" altLang="en-US" dirty="0"/>
+          </a:p>
+        </p:txBody>
+      </p:sp>
+      <p:sp>
+        <p:nvSpPr>
+          <p:cNvPr id="4" name="슬라이드 번호 개체 틀 3"/>
+          <p:cNvSpPr>
+            <a:spLocks noGrp="1"/>
+          </p:cNvSpPr>
+          <p:nvPr>
+            <p:ph type="sldNum" sz="quarter" idx="5"/>
+          </p:nvPr>
+        </p:nvSpPr>
+        <p:spPr/>
+        <p:txBody>
+          <a:bodyPr/>
+          <a:lstStyle/>
+          <a:p>
+            <a:fld id="{4675AE4A-EE05-4067-AD01-15555BA68CD0}" type="slidenum">
+              <a:rPr lang="ko-KR" altLang="en-US" smtClean="0"/>
+              <a:t>18</a:t>
+            </a:fld>
+            <a:endParaRPr lang="ko-KR" altLang="en-US"/>
+          </a:p>
+        </p:txBody>
+      </p:sp>
+    </p:spTree>
+    <p:extLst>
+      <p:ext uri="{BB962C8B-B14F-4D97-AF65-F5344CB8AC3E}">
+        <p14:creationId xmlns:p14="http://schemas.microsoft.com/office/powerpoint/2010/main" val="318337709"/>
+      </p:ext>
+    </p:extLst>
+  </p:cSld>
+  <p:clrMapOvr>
+    <a:masterClrMapping/>
+  </p:clrMapOvr>
+</p:notes>
 </file>
 
 <file path=ppt/slideLayouts/slideLayout1.xml><?xml version="1.0" encoding="utf-8"?>
@@ -12126,8 +12210,8 @@
           </a:p>
         </p:txBody>
       </p:sp>
-      <mc:AlternateContent xmlns:mc="http://schemas.openxmlformats.org/markup-compatibility/2006">
-        <mc:Choice xmlns:a14="http://schemas.microsoft.com/office/drawing/2010/main" Requires="a14">
+      <mc:AlternateContent xmlns:mc="http://schemas.openxmlformats.org/markup-compatibility/2006" xmlns:a14="http://schemas.microsoft.com/office/drawing/2010/main">
+        <mc:Choice Requires="a14">
           <p:sp>
             <p:nvSpPr>
               <p:cNvPr id="3" name="내용 개체 틀 2">
@@ -12303,7 +12387,7 @@
             </p:txBody>
           </p:sp>
         </mc:Choice>
-        <mc:Fallback>
+        <mc:Fallback xmlns="">
           <p:sp>
             <p:nvSpPr>
               <p:cNvPr id="3" name="내용 개체 틀 2">
@@ -12527,8 +12611,8 @@
           </a:p>
         </p:txBody>
       </p:sp>
-      <mc:AlternateContent xmlns:mc="http://schemas.openxmlformats.org/markup-compatibility/2006">
-        <mc:Choice xmlns:a14="http://schemas.microsoft.com/office/drawing/2010/main" Requires="a14">
+      <mc:AlternateContent xmlns:mc="http://schemas.openxmlformats.org/markup-compatibility/2006" xmlns:a14="http://schemas.microsoft.com/office/drawing/2010/main">
+        <mc:Choice Requires="a14">
           <p:sp>
             <p:nvSpPr>
               <p:cNvPr id="3" name="내용 개체 틀 2">
@@ -13970,7 +14054,7 @@
             </p:txBody>
           </p:sp>
         </mc:Choice>
-        <mc:Fallback>
+        <mc:Fallback xmlns="">
           <p:sp>
             <p:nvSpPr>
               <p:cNvPr id="3" name="내용 개체 틀 2">
@@ -14104,8 +14188,8 @@
           </a:p>
         </p:txBody>
       </p:sp>
-      <mc:AlternateContent xmlns:mc="http://schemas.openxmlformats.org/markup-compatibility/2006">
-        <mc:Choice xmlns:a14="http://schemas.microsoft.com/office/drawing/2010/main" Requires="a14">
+      <mc:AlternateContent xmlns:mc="http://schemas.openxmlformats.org/markup-compatibility/2006" xmlns:a14="http://schemas.microsoft.com/office/drawing/2010/main">
+        <mc:Choice Requires="a14">
           <p:sp>
             <p:nvSpPr>
               <p:cNvPr id="3" name="내용 개체 틀 2">
@@ -15907,7 +15991,7 @@
             </p:txBody>
           </p:sp>
         </mc:Choice>
-        <mc:Fallback>
+        <mc:Fallback xmlns="">
           <p:sp>
             <p:nvSpPr>
               <p:cNvPr id="3" name="내용 개체 틀 2">
@@ -16041,8 +16125,8 @@
           </a:p>
         </p:txBody>
       </p:sp>
-      <mc:AlternateContent xmlns:mc="http://schemas.openxmlformats.org/markup-compatibility/2006">
-        <mc:Choice xmlns:a14="http://schemas.microsoft.com/office/drawing/2010/main" Requires="a14">
+      <mc:AlternateContent xmlns:mc="http://schemas.openxmlformats.org/markup-compatibility/2006" xmlns:a14="http://schemas.microsoft.com/office/drawing/2010/main">
+        <mc:Choice Requires="a14">
           <p:sp>
             <p:nvSpPr>
               <p:cNvPr id="3" name="내용 개체 틀 2">
@@ -17764,7 +17848,7 @@
             </p:txBody>
           </p:sp>
         </mc:Choice>
-        <mc:Fallback>
+        <mc:Fallback xmlns="">
           <p:sp>
             <p:nvSpPr>
               <p:cNvPr id="3" name="내용 개체 틀 2">
@@ -18228,8 +18312,8 @@
           </a:p>
         </p:txBody>
       </p:sp>
-      <mc:AlternateContent xmlns:mc="http://schemas.openxmlformats.org/markup-compatibility/2006">
-        <mc:Choice xmlns:a14="http://schemas.microsoft.com/office/drawing/2010/main" Requires="a14">
+      <mc:AlternateContent xmlns:mc="http://schemas.openxmlformats.org/markup-compatibility/2006" xmlns:a14="http://schemas.microsoft.com/office/drawing/2010/main">
+        <mc:Choice Requires="a14">
           <p:sp>
             <p:nvSpPr>
               <p:cNvPr id="3" name="내용 개체 틀 2">
@@ -18659,7 +18743,7 @@
                     <m:sSub>
                       <m:sSubPr>
                         <m:ctrlPr>
-                          <a:rPr lang="en-US" altLang="ko-KR" b="0" i="0" smtClean="0">
+                          <a:rPr lang="en-US" altLang="ko-KR" b="0" i="1" smtClean="0">
                             <a:latin typeface="Cambria Math" panose="02040503050406030204" pitchFamily="18" charset="0"/>
                           </a:rPr>
                         </m:ctrlPr>
@@ -19670,7 +19754,7 @@
             </p:txBody>
           </p:sp>
         </mc:Choice>
-        <mc:Fallback>
+        <mc:Fallback xmlns="">
           <p:sp>
             <p:nvSpPr>
               <p:cNvPr id="3" name="내용 개체 틀 2">
@@ -19804,8 +19888,8 @@
           </a:p>
         </p:txBody>
       </p:sp>
-      <mc:AlternateContent xmlns:mc="http://schemas.openxmlformats.org/markup-compatibility/2006">
-        <mc:Choice xmlns:a14="http://schemas.microsoft.com/office/drawing/2010/main" Requires="a14">
+      <mc:AlternateContent xmlns:mc="http://schemas.openxmlformats.org/markup-compatibility/2006" xmlns:a14="http://schemas.microsoft.com/office/drawing/2010/main">
+        <mc:Choice Requires="a14">
           <p:sp>
             <p:nvSpPr>
               <p:cNvPr id="3" name="내용 개체 틀 2">
@@ -20105,7 +20189,13 @@
                                     <a:rPr lang="en-US" altLang="ko-KR" b="0" i="1" smtClean="0">
                                       <a:latin typeface="Cambria Math" panose="02040503050406030204" pitchFamily="18" charset="0"/>
                                     </a:rPr>
-                                    <m:t>𝐹𝑖𝑥𝑒𝑑</m:t>
+                                    <m:t>𝐹</m:t>
+                                  </m:r>
+                                  <m:r>
+                                    <a:rPr lang="en-US" altLang="ko-KR" b="0" i="1" smtClean="0">
+                                      <a:latin typeface="Cambria Math" panose="02040503050406030204" pitchFamily="18" charset="0"/>
+                                    </a:rPr>
+                                    <m:t>𝑖𝑥𝑒𝑑</m:t>
                                   </m:r>
                                   <m:r>
                                     <a:rPr lang="en-US" altLang="ko-KR" b="0" i="1" smtClean="0">
@@ -21891,7 +21981,7 @@
             </p:txBody>
           </p:sp>
         </mc:Choice>
-        <mc:Fallback>
+        <mc:Fallback xmlns="">
           <p:sp>
             <p:nvSpPr>
               <p:cNvPr id="3" name="내용 개체 틀 2">
@@ -22595,7 +22685,19 @@
                       <a:rPr lang="en-US" altLang="ko-KR" b="0" i="1" dirty="0" smtClean="0">
                         <a:latin typeface="Cambria Math" panose="02040503050406030204" pitchFamily="18" charset="0"/>
                       </a:rPr>
-                      <m:t>𝑅𝑀𝐴𝐸</m:t>
+                      <m:t>𝑅𝑀</m:t>
+                    </m:r>
+                    <m:r>
+                      <a:rPr lang="en-US" altLang="ko-KR" b="0" i="1" dirty="0" smtClean="0">
+                        <a:latin typeface="Cambria Math" panose="02040503050406030204" pitchFamily="18" charset="0"/>
+                      </a:rPr>
+                      <m:t>𝑆</m:t>
+                    </m:r>
+                    <m:r>
+                      <a:rPr lang="en-US" altLang="ko-KR" b="0" i="1" dirty="0" smtClean="0">
+                        <a:latin typeface="Cambria Math" panose="02040503050406030204" pitchFamily="18" charset="0"/>
+                      </a:rPr>
+                      <m:t>𝐸</m:t>
                     </m:r>
                     <m:r>
                       <a:rPr lang="en-US" altLang="ko-KR" b="0" i="1" dirty="0" smtClean="0">
@@ -23421,7 +23523,7 @@
           <p:nvPr/>
         </p:nvPicPr>
         <p:blipFill>
-          <a:blip r:embed="rId2"/>
+          <a:blip r:embed="rId3"/>
           <a:stretch>
             <a:fillRect/>
           </a:stretch>
@@ -24286,8 +24388,8 @@
           </a:p>
         </p:txBody>
       </p:sp>
-      <mc:AlternateContent xmlns:mc="http://schemas.openxmlformats.org/markup-compatibility/2006">
-        <mc:Choice xmlns:a14="http://schemas.microsoft.com/office/drawing/2010/main" Requires="a14">
+      <mc:AlternateContent xmlns:mc="http://schemas.openxmlformats.org/markup-compatibility/2006" xmlns:a14="http://schemas.microsoft.com/office/drawing/2010/main">
+        <mc:Choice Requires="a14">
           <p:sp>
             <p:nvSpPr>
               <p:cNvPr id="3" name="내용 개체 틀 2">
@@ -24821,7 +24923,7 @@
             </p:txBody>
           </p:sp>
         </mc:Choice>
-        <mc:Fallback>
+        <mc:Fallback xmlns="">
           <p:sp>
             <p:nvSpPr>
               <p:cNvPr id="3" name="내용 개체 틀 2">
@@ -24985,8 +25087,8 @@
           </a:p>
         </p:txBody>
       </p:sp>
-      <mc:AlternateContent xmlns:mc="http://schemas.openxmlformats.org/markup-compatibility/2006">
-        <mc:Choice xmlns:a14="http://schemas.microsoft.com/office/drawing/2010/main" Requires="a14">
+      <mc:AlternateContent xmlns:mc="http://schemas.openxmlformats.org/markup-compatibility/2006" xmlns:a14="http://schemas.microsoft.com/office/drawing/2010/main">
+        <mc:Choice Requires="a14">
           <p:sp>
             <p:nvSpPr>
               <p:cNvPr id="3" name="내용 개체 틀 2">
@@ -25205,7 +25307,7 @@
             </p:txBody>
           </p:sp>
         </mc:Choice>
-        <mc:Fallback>
+        <mc:Fallback xmlns="">
           <p:sp>
             <p:nvSpPr>
               <p:cNvPr id="3" name="내용 개체 틀 2">
@@ -25369,8 +25471,8 @@
           </a:p>
         </p:txBody>
       </p:sp>
-      <mc:AlternateContent xmlns:mc="http://schemas.openxmlformats.org/markup-compatibility/2006">
-        <mc:Choice xmlns:a14="http://schemas.microsoft.com/office/drawing/2010/main" Requires="a14">
+      <mc:AlternateContent xmlns:mc="http://schemas.openxmlformats.org/markup-compatibility/2006" xmlns:a14="http://schemas.microsoft.com/office/drawing/2010/main">
+        <mc:Choice Requires="a14">
           <p:sp>
             <p:nvSpPr>
               <p:cNvPr id="3" name="내용 개체 틀 2">
@@ -25814,7 +25916,7 @@
             </p:txBody>
           </p:sp>
         </mc:Choice>
-        <mc:Fallback>
+        <mc:Fallback xmlns="">
           <p:sp>
             <p:nvSpPr>
               <p:cNvPr id="3" name="내용 개체 틀 2">
@@ -26008,8 +26110,8 @@
           </a:p>
         </p:txBody>
       </p:sp>
-      <mc:AlternateContent xmlns:mc="http://schemas.openxmlformats.org/markup-compatibility/2006">
-        <mc:Choice xmlns:a14="http://schemas.microsoft.com/office/drawing/2010/main" Requires="a14">
+      <mc:AlternateContent xmlns:mc="http://schemas.openxmlformats.org/markup-compatibility/2006" xmlns:a14="http://schemas.microsoft.com/office/drawing/2010/main">
+        <mc:Choice Requires="a14">
           <p:sp>
             <p:nvSpPr>
               <p:cNvPr id="3" name="내용 개체 틀 2">
@@ -26464,7 +26566,7 @@
             </p:txBody>
           </p:sp>
         </mc:Choice>
-        <mc:Fallback>
+        <mc:Fallback xmlns="">
           <p:sp>
             <p:nvSpPr>
               <p:cNvPr id="3" name="내용 개체 틀 2">
@@ -26632,8 +26734,8 @@
           </a:p>
         </p:txBody>
       </p:sp>
-      <mc:AlternateContent xmlns:mc="http://schemas.openxmlformats.org/markup-compatibility/2006">
-        <mc:Choice xmlns:a14="http://schemas.microsoft.com/office/drawing/2010/main" Requires="a14">
+      <mc:AlternateContent xmlns:mc="http://schemas.openxmlformats.org/markup-compatibility/2006" xmlns:a14="http://schemas.microsoft.com/office/drawing/2010/main">
+        <mc:Choice Requires="a14">
           <p:sp>
             <p:nvSpPr>
               <p:cNvPr id="3" name="내용 개체 틀 2">
@@ -26993,7 +27095,7 @@
             </p:txBody>
           </p:sp>
         </mc:Choice>
-        <mc:Fallback>
+        <mc:Fallback xmlns="">
           <p:sp>
             <p:nvSpPr>
               <p:cNvPr id="3" name="내용 개체 틀 2">
@@ -27917,8 +28019,8 @@
           </a:p>
         </p:txBody>
       </p:sp>
-      <mc:AlternateContent xmlns:mc="http://schemas.openxmlformats.org/markup-compatibility/2006">
-        <mc:Choice xmlns:a14="http://schemas.microsoft.com/office/drawing/2010/main" Requires="a14">
+      <mc:AlternateContent xmlns:mc="http://schemas.openxmlformats.org/markup-compatibility/2006" xmlns:a14="http://schemas.microsoft.com/office/drawing/2010/main">
+        <mc:Choice Requires="a14">
           <p:sp>
             <p:nvSpPr>
               <p:cNvPr id="3" name="내용 개체 틀 2">
@@ -28187,7 +28289,7 @@
             </p:txBody>
           </p:sp>
         </mc:Choice>
-        <mc:Fallback>
+        <mc:Fallback xmlns="">
           <p:sp>
             <p:nvSpPr>
               <p:cNvPr id="3" name="내용 개체 틀 2">

</xml_diff>